<commit_message>
lecture-2-practice-of-conversion-string-number-and-datetime: remove the content from datetime sheet
</commit_message>
<xml_diff>
--- a/Class Content/Day 2/JavaScript Lesson 2.pptx
+++ b/Class Content/Day 2/JavaScript Lesson 2.pptx
@@ -10735,15 +10735,6 @@
               <a:buNone/>
             </a:pPr>
             <a:r>
-              <a:rPr lang="en-US" dirty="0"/>
-              <a:t>Benchmarking</a:t>
-            </a:r>
-          </a:p>
-          <a:p>
-            <a:pPr marL="0" indent="0">
-              <a:buNone/>
-            </a:pPr>
-            <a:r>
               <a:rPr lang="en-US" dirty="0" err="1"/>
               <a:t>Date.parse</a:t>
             </a:r>

</xml_diff>